<commit_message>
Update Lecture 05 - Feature Extraction.pptx
</commit_message>
<xml_diff>
--- a/ComputerVision/Lecture 05 - Feature Extraction/Lecture 05 - Feature Extraction.pptx
+++ b/ComputerVision/Lecture 05 - Feature Extraction/Lecture 05 - Feature Extraction.pptx
@@ -6,7 +6,7 @@
     <p:sldMasterId id="2147483661" r:id="rId2"/>
   </p:sldMasterIdLst>
   <p:notesMasterIdLst>
-    <p:notesMasterId r:id="rId17"/>
+    <p:notesMasterId r:id="rId18"/>
   </p:notesMasterIdLst>
   <p:sldIdLst>
     <p:sldId id="256" r:id="rId3"/>
@@ -23,6 +23,7 @@
     <p:sldId id="300" r:id="rId14"/>
     <p:sldId id="301" r:id="rId15"/>
     <p:sldId id="302" r:id="rId16"/>
+    <p:sldId id="303" r:id="rId17"/>
   </p:sldIdLst>
   <p:sldSz cx="10080625" cy="7559675"/>
   <p:notesSz cx="7559675" cy="10691813"/>
@@ -2542,6 +2543,140 @@
 </p:notes>
 </file>
 
+<file path=ppt/notesSlides/notesSlide15.xml><?xml version="1.0" encoding="utf-8"?>
+<p:notes xmlns:a="http://schemas.openxmlformats.org/drawingml/2006/main" xmlns:r="http://schemas.openxmlformats.org/officeDocument/2006/relationships" xmlns:p="http://schemas.openxmlformats.org/presentationml/2006/main">
+  <p:cSld>
+    <p:spTree>
+      <p:nvGrpSpPr>
+        <p:cNvPr id="1" name=""/>
+        <p:cNvGrpSpPr/>
+        <p:nvPr/>
+      </p:nvGrpSpPr>
+      <p:grpSpPr>
+        <a:xfrm>
+          <a:off x="0" y="0"/>
+          <a:ext cx="0" cy="0"/>
+          <a:chOff x="0" y="0"/>
+          <a:chExt cx="0" cy="0"/>
+        </a:xfrm>
+      </p:grpSpPr>
+      <p:sp>
+        <p:nvSpPr>
+          <p:cNvPr id="168" name="PlaceHolder 1"/>
+          <p:cNvSpPr>
+            <a:spLocks noGrp="1" noRot="1" noChangeAspect="1"/>
+          </p:cNvSpPr>
+          <p:nvPr>
+            <p:ph type="sldImg"/>
+          </p:nvPr>
+        </p:nvSpPr>
+        <p:spPr>
+          <a:xfrm>
+            <a:off x="1376363" y="1336675"/>
+            <a:ext cx="4803775" cy="3603625"/>
+          </a:xfrm>
+          <a:prstGeom prst="rect">
+            <a:avLst/>
+          </a:prstGeom>
+        </p:spPr>
+      </p:sp>
+      <p:sp>
+        <p:nvSpPr>
+          <p:cNvPr id="169" name="PlaceHolder 2"/>
+          <p:cNvSpPr>
+            <a:spLocks noGrp="1"/>
+          </p:cNvSpPr>
+          <p:nvPr>
+            <p:ph type="body"/>
+          </p:nvPr>
+        </p:nvSpPr>
+        <p:spPr>
+          <a:xfrm>
+            <a:off x="756000" y="5145120"/>
+            <a:ext cx="6044040" cy="4206240"/>
+          </a:xfrm>
+          <a:prstGeom prst="rect">
+            <a:avLst/>
+          </a:prstGeom>
+        </p:spPr>
+        <p:txBody>
+          <a:bodyPr lIns="0" tIns="0" rIns="0" bIns="0"/>
+          <a:lstStyle/>
+          <a:p>
+            <a:endParaRPr lang="pt-BR" sz="2000" b="0" strike="noStrike" spc="-1">
+              <a:latin typeface="Arial"/>
+            </a:endParaRPr>
+          </a:p>
+        </p:txBody>
+      </p:sp>
+      <p:sp>
+        <p:nvSpPr>
+          <p:cNvPr id="170" name="CustomShape 3"/>
+          <p:cNvSpPr/>
+          <p:nvPr/>
+        </p:nvSpPr>
+        <p:spPr>
+          <a:xfrm>
+            <a:off x="0" y="10155240"/>
+            <a:ext cx="3272400" cy="532800"/>
+          </a:xfrm>
+          <a:prstGeom prst="rect">
+            <a:avLst/>
+          </a:prstGeom>
+          <a:noFill/>
+          <a:ln>
+            <a:noFill/>
+          </a:ln>
+        </p:spPr>
+        <p:style>
+          <a:lnRef idx="0">
+            <a:scrgbClr r="0" g="0" b="0"/>
+          </a:lnRef>
+          <a:fillRef idx="0">
+            <a:scrgbClr r="0" g="0" b="0"/>
+          </a:fillRef>
+          <a:effectRef idx="0">
+            <a:scrgbClr r="0" g="0" b="0"/>
+          </a:effectRef>
+          <a:fontRef idx="minor"/>
+        </p:style>
+        <p:txBody>
+          <a:bodyPr lIns="90000" tIns="45000" rIns="90000" bIns="45000" anchor="b"/>
+          <a:lstStyle/>
+          <a:p>
+            <a:pPr>
+              <a:lnSpc>
+                <a:spcPct val="100000"/>
+              </a:lnSpc>
+            </a:pPr>
+            <a:r>
+              <a:rPr lang="pt-BR" sz="1200" b="0" strike="noStrike" spc="-1">
+                <a:solidFill>
+                  <a:srgbClr val="000000"/>
+                </a:solidFill>
+                <a:latin typeface="Times New Roman"/>
+              </a:rPr>
+              <a:t>Prof. André Hochuli</a:t>
+            </a:r>
+            <a:endParaRPr lang="pt-BR" sz="1200" b="0" strike="noStrike" spc="-1">
+              <a:latin typeface="Arial"/>
+            </a:endParaRPr>
+          </a:p>
+        </p:txBody>
+      </p:sp>
+    </p:spTree>
+    <p:extLst>
+      <p:ext uri="{BB962C8B-B14F-4D97-AF65-F5344CB8AC3E}">
+        <p14:creationId xmlns:p14="http://schemas.microsoft.com/office/powerpoint/2010/main" val="1195988184"/>
+      </p:ext>
+    </p:extLst>
+  </p:cSld>
+  <p:clrMapOvr>
+    <a:masterClrMapping/>
+  </p:clrMapOvr>
+</p:notes>
+</file>
+
 <file path=ppt/notesSlides/notesSlide2.xml><?xml version="1.0" encoding="utf-8"?>
 <p:notes xmlns:a="http://schemas.openxmlformats.org/drawingml/2006/main" xmlns:r="http://schemas.openxmlformats.org/officeDocument/2006/relationships" xmlns:p="http://schemas.openxmlformats.org/presentationml/2006/main">
   <p:cSld>
@@ -10737,6 +10872,500 @@
     <p:extLst>
       <p:ext uri="{BB962C8B-B14F-4D97-AF65-F5344CB8AC3E}">
         <p14:creationId xmlns:p14="http://schemas.microsoft.com/office/powerpoint/2010/main" val="2388642052"/>
+      </p:ext>
+    </p:extLst>
+  </p:cSld>
+  <p:clrMapOvr>
+    <a:masterClrMapping/>
+  </p:clrMapOvr>
+  <p:timing>
+    <p:tnLst>
+      <p:par>
+        <p:cTn id="1" dur="indefinite" restart="never" nodeType="tmRoot">
+          <p:childTnLst>
+            <p:seq>
+              <p:cTn id="2" dur="indefinite" nodeType="mainSeq"/>
+              <p:prevCondLst>
+                <p:cond evt="onPrev" delay="0">
+                  <p:tgtEl>
+                    <p:sldTgt/>
+                  </p:tgtEl>
+                </p:cond>
+              </p:prevCondLst>
+              <p:nextCondLst>
+                <p:cond evt="onNext" delay="0">
+                  <p:tgtEl>
+                    <p:sldTgt/>
+                  </p:tgtEl>
+                </p:cond>
+              </p:nextCondLst>
+            </p:seq>
+          </p:childTnLst>
+        </p:cTn>
+      </p:par>
+    </p:tnLst>
+  </p:timing>
+</p:sld>
+</file>
+
+<file path=ppt/slides/slide15.xml><?xml version="1.0" encoding="utf-8"?>
+<p:sld xmlns:a="http://schemas.openxmlformats.org/drawingml/2006/main" xmlns:r="http://schemas.openxmlformats.org/officeDocument/2006/relationships" xmlns:p="http://schemas.openxmlformats.org/presentationml/2006/main">
+  <p:cSld>
+    <p:spTree>
+      <p:nvGrpSpPr>
+        <p:cNvPr id="1" name=""/>
+        <p:cNvGrpSpPr/>
+        <p:nvPr/>
+      </p:nvGrpSpPr>
+      <p:grpSpPr>
+        <a:xfrm>
+          <a:off x="0" y="0"/>
+          <a:ext cx="0" cy="0"/>
+          <a:chOff x="0" y="0"/>
+          <a:chExt cx="0" cy="0"/>
+        </a:xfrm>
+      </p:grpSpPr>
+      <p:sp>
+        <p:nvSpPr>
+          <p:cNvPr id="99" name="CustomShape 1"/>
+          <p:cNvSpPr/>
+          <p:nvPr/>
+        </p:nvSpPr>
+        <p:spPr>
+          <a:xfrm>
+            <a:off x="360000" y="360000"/>
+            <a:ext cx="9356400" cy="896400"/>
+          </a:xfrm>
+          <a:prstGeom prst="rect">
+            <a:avLst/>
+          </a:prstGeom>
+          <a:noFill/>
+          <a:ln>
+            <a:noFill/>
+          </a:ln>
+        </p:spPr>
+        <p:style>
+          <a:lnRef idx="0">
+            <a:scrgbClr r="0" g="0" b="0"/>
+          </a:lnRef>
+          <a:fillRef idx="0">
+            <a:scrgbClr r="0" g="0" b="0"/>
+          </a:fillRef>
+          <a:effectRef idx="0">
+            <a:scrgbClr r="0" g="0" b="0"/>
+          </a:effectRef>
+          <a:fontRef idx="minor"/>
+        </p:style>
+        <p:txBody>
+          <a:bodyPr lIns="0" tIns="0" rIns="0" bIns="0" anchor="b"/>
+          <a:lstStyle/>
+          <a:p>
+            <a:r>
+              <a:rPr lang="en-US" sz="3200" b="1" spc="-1" dirty="0">
+                <a:solidFill>
+                  <a:srgbClr val="FFFFFF"/>
+                </a:solidFill>
+                <a:latin typeface="Latin Modern Sans"/>
+              </a:rPr>
+              <a:t>Didactic Quality Questionnaire</a:t>
+            </a:r>
+            <a:endParaRPr lang="en-US" sz="3200" b="0" strike="noStrike" spc="-1" dirty="0">
+              <a:latin typeface="Arial"/>
+            </a:endParaRPr>
+          </a:p>
+        </p:txBody>
+      </p:sp>
+      <p:sp>
+        <p:nvSpPr>
+          <p:cNvPr id="9" name="CustomShape 2">
+            <a:extLst>
+              <a:ext uri="{FF2B5EF4-FFF2-40B4-BE49-F238E27FC236}">
+                <a16:creationId xmlns:a16="http://schemas.microsoft.com/office/drawing/2014/main" id="{7D27D924-BAD9-59EB-0956-442C5E618C62}"/>
+              </a:ext>
+            </a:extLst>
+          </p:cNvPr>
+          <p:cNvSpPr/>
+          <p:nvPr/>
+        </p:nvSpPr>
+        <p:spPr>
+          <a:xfrm>
+            <a:off x="897120" y="6886080"/>
+            <a:ext cx="6443640" cy="361440"/>
+          </a:xfrm>
+          <a:prstGeom prst="rect">
+            <a:avLst/>
+          </a:prstGeom>
+          <a:noFill/>
+          <a:ln>
+            <a:noFill/>
+          </a:ln>
+        </p:spPr>
+        <p:style>
+          <a:lnRef idx="0">
+            <a:scrgbClr r="0" g="0" b="0"/>
+          </a:lnRef>
+          <a:fillRef idx="0">
+            <a:scrgbClr r="0" g="0" b="0"/>
+          </a:fillRef>
+          <a:effectRef idx="0">
+            <a:scrgbClr r="0" g="0" b="0"/>
+          </a:effectRef>
+          <a:fontRef idx="minor"/>
+        </p:style>
+        <p:txBody>
+          <a:bodyPr lIns="90000" tIns="45000" rIns="90000" bIns="45000"/>
+          <a:lstStyle/>
+          <a:p>
+            <a:pPr>
+              <a:lnSpc>
+                <a:spcPct val="100000"/>
+              </a:lnSpc>
+            </a:pPr>
+            <a:r>
+              <a:rPr lang="pt-BR" sz="1800" b="0" strike="noStrike" spc="-1" dirty="0">
+                <a:solidFill>
+                  <a:srgbClr val="000000"/>
+                </a:solidFill>
+                <a:latin typeface="Arial"/>
+                <a:ea typeface="DejaVu Sans"/>
+              </a:rPr>
+              <a:t>Computer Vision - Prof. André Hochuli</a:t>
+            </a:r>
+            <a:endParaRPr lang="pt-BR" sz="1800" b="0" strike="noStrike" spc="-1" dirty="0">
+              <a:latin typeface="Arial"/>
+            </a:endParaRPr>
+          </a:p>
+        </p:txBody>
+      </p:sp>
+      <p:sp>
+        <p:nvSpPr>
+          <p:cNvPr id="10" name="CustomShape 3">
+            <a:extLst>
+              <a:ext uri="{FF2B5EF4-FFF2-40B4-BE49-F238E27FC236}">
+                <a16:creationId xmlns:a16="http://schemas.microsoft.com/office/drawing/2014/main" id="{78C456B9-B5EA-AE0A-55ED-2B32CE41C07D}"/>
+              </a:ext>
+            </a:extLst>
+          </p:cNvPr>
+          <p:cNvSpPr/>
+          <p:nvPr/>
+        </p:nvSpPr>
+        <p:spPr>
+          <a:xfrm>
+            <a:off x="7608600" y="6886080"/>
+            <a:ext cx="2281680" cy="361440"/>
+          </a:xfrm>
+          <a:prstGeom prst="rect">
+            <a:avLst/>
+          </a:prstGeom>
+          <a:noFill/>
+          <a:ln>
+            <a:noFill/>
+          </a:ln>
+        </p:spPr>
+        <p:style>
+          <a:lnRef idx="0">
+            <a:scrgbClr r="0" g="0" b="0"/>
+          </a:lnRef>
+          <a:fillRef idx="0">
+            <a:scrgbClr r="0" g="0" b="0"/>
+          </a:fillRef>
+          <a:effectRef idx="0">
+            <a:scrgbClr r="0" g="0" b="0"/>
+          </a:effectRef>
+          <a:fontRef idx="minor"/>
+        </p:style>
+        <p:txBody>
+          <a:bodyPr lIns="90000" tIns="45000" rIns="90000" bIns="45000"/>
+          <a:lstStyle/>
+          <a:p>
+            <a:pPr>
+              <a:lnSpc>
+                <a:spcPct val="100000"/>
+              </a:lnSpc>
+            </a:pPr>
+            <a:r>
+              <a:rPr lang="en-US" sz="1800" b="0" strike="noStrike" spc="-1" dirty="0">
+                <a:solidFill>
+                  <a:srgbClr val="000000"/>
+                </a:solidFill>
+                <a:latin typeface="Arial"/>
+                <a:ea typeface="DejaVu Sans"/>
+              </a:rPr>
+              <a:t>Lecture</a:t>
+            </a:r>
+            <a:r>
+              <a:rPr lang="pt-BR" sz="1800" b="0" strike="noStrike" spc="-1" dirty="0">
+                <a:solidFill>
+                  <a:srgbClr val="000000"/>
+                </a:solidFill>
+                <a:latin typeface="Arial"/>
+                <a:ea typeface="DejaVu Sans"/>
+              </a:rPr>
+              <a:t> </a:t>
+            </a:r>
+            <a:r>
+              <a:rPr lang="pt-BR" spc="-1" dirty="0">
+                <a:solidFill>
+                  <a:srgbClr val="000000"/>
+                </a:solidFill>
+                <a:latin typeface="Arial"/>
+                <a:ea typeface="DejaVu Sans"/>
+              </a:rPr>
+              <a:t>05</a:t>
+            </a:r>
+            <a:endParaRPr lang="pt-BR" sz="1800" b="0" strike="noStrike" spc="-1" dirty="0">
+              <a:latin typeface="Arial"/>
+            </a:endParaRPr>
+          </a:p>
+        </p:txBody>
+      </p:sp>
+      <p:sp>
+        <p:nvSpPr>
+          <p:cNvPr id="2" name="CaixaDeTexto 1">
+            <a:extLst>
+              <a:ext uri="{FF2B5EF4-FFF2-40B4-BE49-F238E27FC236}">
+                <a16:creationId xmlns:a16="http://schemas.microsoft.com/office/drawing/2014/main" id="{D744B707-1B4A-5A5F-CC17-5C9D8382FBD9}"/>
+              </a:ext>
+            </a:extLst>
+          </p:cNvPr>
+          <p:cNvSpPr txBox="1"/>
+          <p:nvPr/>
+        </p:nvSpPr>
+        <p:spPr>
+          <a:xfrm>
+            <a:off x="200025" y="1673771"/>
+            <a:ext cx="9516375" cy="1477328"/>
+          </a:xfrm>
+          <a:prstGeom prst="rect">
+            <a:avLst/>
+          </a:prstGeom>
+          <a:noFill/>
+        </p:spPr>
+        <p:txBody>
+          <a:bodyPr wrap="square" rtlCol="0">
+            <a:spAutoFit/>
+          </a:bodyPr>
+          <a:lstStyle/>
+          <a:p>
+            <a:pPr marL="285750" indent="-285750">
+              <a:buFont typeface="Arial" panose="020B0604020202020204" pitchFamily="34" charset="0"/>
+              <a:buChar char="•"/>
+            </a:pPr>
+            <a:r>
+              <a:rPr lang="en-US" dirty="0">
+                <a:latin typeface="Calibri" panose="020F0502020204030204" pitchFamily="34" charset="0"/>
+                <a:cs typeface="Calibri" panose="020F0502020204030204" pitchFamily="34" charset="0"/>
+              </a:rPr>
+              <a:t>Let me know your thoughts about</a:t>
+            </a:r>
+          </a:p>
+          <a:p>
+            <a:pPr marL="742950" lvl="1" indent="-285750">
+              <a:buFont typeface="Arial" panose="020B0604020202020204" pitchFamily="34" charset="0"/>
+              <a:buChar char="•"/>
+            </a:pPr>
+            <a:r>
+              <a:rPr lang="en-US" dirty="0">
+                <a:latin typeface="Calibri" panose="020F0502020204030204" pitchFamily="34" charset="0"/>
+                <a:cs typeface="Calibri" panose="020F0502020204030204" pitchFamily="34" charset="0"/>
+              </a:rPr>
+              <a:t>Lectures, Didactic, Materials and Professor</a:t>
+            </a:r>
+          </a:p>
+          <a:p>
+            <a:pPr lvl="1"/>
+            <a:endParaRPr lang="en-US" dirty="0">
+              <a:latin typeface="Calibri" panose="020F0502020204030204" pitchFamily="34" charset="0"/>
+              <a:cs typeface="Calibri" panose="020F0502020204030204" pitchFamily="34" charset="0"/>
+            </a:endParaRPr>
+          </a:p>
+          <a:p>
+            <a:endParaRPr lang="en-US" dirty="0">
+              <a:latin typeface="Calibri" panose="020F0502020204030204" pitchFamily="34" charset="0"/>
+              <a:cs typeface="Calibri" panose="020F0502020204030204" pitchFamily="34" charset="0"/>
+            </a:endParaRPr>
+          </a:p>
+          <a:p>
+            <a:pPr marL="285750" indent="-285750">
+              <a:buFont typeface="Arial" panose="020B0604020202020204" pitchFamily="34" charset="0"/>
+              <a:buChar char="•"/>
+            </a:pPr>
+            <a:endParaRPr lang="en-US" dirty="0">
+              <a:latin typeface="Calibri" panose="020F0502020204030204" pitchFamily="34" charset="0"/>
+              <a:cs typeface="Calibri" panose="020F0502020204030204" pitchFamily="34" charset="0"/>
+            </a:endParaRPr>
+          </a:p>
+        </p:txBody>
+      </p:sp>
+      <p:sp>
+        <p:nvSpPr>
+          <p:cNvPr id="5" name="AutoShape 12" descr="Horizontal and vertical projection of histogram for normalized sample image">
+            <a:extLst>
+              <a:ext uri="{FF2B5EF4-FFF2-40B4-BE49-F238E27FC236}">
+                <a16:creationId xmlns:a16="http://schemas.microsoft.com/office/drawing/2014/main" id="{DD6D3762-E0BF-CCFE-0AB5-9A9B3D3BE2F6}"/>
+              </a:ext>
+            </a:extLst>
+          </p:cNvPr>
+          <p:cNvSpPr>
+            <a:spLocks noChangeAspect="1" noChangeArrowheads="1"/>
+          </p:cNvSpPr>
+          <p:nvPr/>
+        </p:nvSpPr>
+        <p:spPr bwMode="auto">
+          <a:xfrm>
+            <a:off x="4887913" y="3627438"/>
+            <a:ext cx="304800" cy="304800"/>
+          </a:xfrm>
+          <a:prstGeom prst="rect">
+            <a:avLst/>
+          </a:prstGeom>
+          <a:noFill/>
+          <a:extLst>
+            <a:ext uri="{909E8E84-426E-40DD-AFC4-6F175D3DCCD1}">
+              <a14:hiddenFill xmlns:a14="http://schemas.microsoft.com/office/drawing/2010/main">
+                <a:solidFill>
+                  <a:srgbClr val="FFFFFF"/>
+                </a:solidFill>
+              </a14:hiddenFill>
+            </a:ext>
+          </a:extLst>
+        </p:spPr>
+        <p:txBody>
+          <a:bodyPr vert="horz" wrap="square" lIns="91440" tIns="45720" rIns="91440" bIns="45720" numCol="1" anchor="t" anchorCtr="0" compatLnSpc="1">
+            <a:prstTxWarp prst="textNoShape">
+              <a:avLst/>
+            </a:prstTxWarp>
+          </a:bodyPr>
+          <a:lstStyle/>
+          <a:p>
+            <a:endParaRPr lang="pt-BR"/>
+          </a:p>
+        </p:txBody>
+      </p:sp>
+      <p:sp>
+        <p:nvSpPr>
+          <p:cNvPr id="14" name="CaixaDeTexto 13">
+            <a:extLst>
+              <a:ext uri="{FF2B5EF4-FFF2-40B4-BE49-F238E27FC236}">
+                <a16:creationId xmlns:a16="http://schemas.microsoft.com/office/drawing/2014/main" id="{9B84B9A1-71A5-3019-786D-22F15EEAE6D6}"/>
+              </a:ext>
+            </a:extLst>
+          </p:cNvPr>
+          <p:cNvSpPr txBox="1"/>
+          <p:nvPr/>
+        </p:nvSpPr>
+        <p:spPr>
+          <a:xfrm>
+            <a:off x="1026160" y="4714240"/>
+            <a:ext cx="184731" cy="369332"/>
+          </a:xfrm>
+          <a:prstGeom prst="rect">
+            <a:avLst/>
+          </a:prstGeom>
+          <a:noFill/>
+        </p:spPr>
+        <p:txBody>
+          <a:bodyPr wrap="none" rtlCol="0">
+            <a:spAutoFit/>
+          </a:bodyPr>
+          <a:lstStyle/>
+          <a:p>
+            <a:endParaRPr lang="pt-BR" dirty="0"/>
+          </a:p>
+        </p:txBody>
+      </p:sp>
+      <p:pic>
+        <p:nvPicPr>
+          <p:cNvPr id="1026" name="Picture 2" descr="QRCode para Avaliação Disciplina / Professor&#10;Visão Computacional">
+            <a:extLst>
+              <a:ext uri="{FF2B5EF4-FFF2-40B4-BE49-F238E27FC236}">
+                <a16:creationId xmlns:a16="http://schemas.microsoft.com/office/drawing/2014/main" id="{42BEB1E4-C007-E3D3-A6DF-F7848B3FC830}"/>
+              </a:ext>
+            </a:extLst>
+          </p:cNvPr>
+          <p:cNvPicPr>
+            <a:picLocks noChangeAspect="1" noChangeArrowheads="1"/>
+          </p:cNvPicPr>
+          <p:nvPr/>
+        </p:nvPicPr>
+        <p:blipFill>
+          <a:blip r:embed="rId3">
+            <a:extLst>
+              <a:ext uri="{28A0092B-C50C-407E-A947-70E740481C1C}">
+                <a14:useLocalDpi xmlns:a14="http://schemas.microsoft.com/office/drawing/2010/main" val="0"/>
+              </a:ext>
+            </a:extLst>
+          </a:blip>
+          <a:srcRect/>
+          <a:stretch>
+            <a:fillRect/>
+          </a:stretch>
+        </p:blipFill>
+        <p:spPr bwMode="auto">
+          <a:xfrm>
+            <a:off x="3118149" y="2530120"/>
+            <a:ext cx="3750011" cy="3750011"/>
+          </a:xfrm>
+          <a:prstGeom prst="rect">
+            <a:avLst/>
+          </a:prstGeom>
+          <a:noFill/>
+          <a:extLst>
+            <a:ext uri="{909E8E84-426E-40DD-AFC4-6F175D3DCCD1}">
+              <a14:hiddenFill xmlns:a14="http://schemas.microsoft.com/office/drawing/2010/main">
+                <a:solidFill>
+                  <a:srgbClr val="FFFFFF"/>
+                </a:solidFill>
+              </a14:hiddenFill>
+            </a:ext>
+          </a:extLst>
+        </p:spPr>
+      </p:pic>
+      <p:sp>
+        <p:nvSpPr>
+          <p:cNvPr id="11" name="CaixaDeTexto 10">
+            <a:extLst>
+              <a:ext uri="{FF2B5EF4-FFF2-40B4-BE49-F238E27FC236}">
+                <a16:creationId xmlns:a16="http://schemas.microsoft.com/office/drawing/2014/main" id="{78AB3737-95AD-1ED0-7C51-001A4F09C53F}"/>
+              </a:ext>
+            </a:extLst>
+          </p:cNvPr>
+          <p:cNvSpPr txBox="1"/>
+          <p:nvPr/>
+        </p:nvSpPr>
+        <p:spPr>
+          <a:xfrm>
+            <a:off x="3012921" y="6344870"/>
+            <a:ext cx="4286567" cy="646331"/>
+          </a:xfrm>
+          <a:prstGeom prst="rect">
+            <a:avLst/>
+          </a:prstGeom>
+          <a:noFill/>
+        </p:spPr>
+        <p:txBody>
+          <a:bodyPr wrap="square">
+            <a:spAutoFit/>
+          </a:bodyPr>
+          <a:lstStyle/>
+          <a:p>
+            <a:r>
+              <a:rPr lang="pt-BR" dirty="0">
+                <a:hlinkClick r:id="rId4"/>
+              </a:rPr>
+              <a:t>https://forms.office.com/r/4ewHS74yrK</a:t>
+            </a:r>
+            <a:endParaRPr lang="pt-BR" dirty="0"/>
+          </a:p>
+          <a:p>
+            <a:endParaRPr lang="pt-BR" dirty="0"/>
+          </a:p>
+        </p:txBody>
+      </p:sp>
+    </p:spTree>
+    <p:extLst>
+      <p:ext uri="{BB962C8B-B14F-4D97-AF65-F5344CB8AC3E}">
+        <p14:creationId xmlns:p14="http://schemas.microsoft.com/office/powerpoint/2010/main" val="3159755741"/>
       </p:ext>
     </p:extLst>
   </p:cSld>

</xml_diff>